<commit_message>
Official QR for the presentation on first page
Signed-off-by: Weber (US), Matthew L <matthew.l.weber3@boeing.com>
</commit_message>
<xml_diff>
--- a/presentations/2026-ELISA-aerospace-wg-Annual_Update.pptx
+++ b/presentations/2026-ELISA-aerospace-wg-Annual_Update.pptx
@@ -4541,80 +4541,6 @@
           </a:p>
         </p:txBody>
       </p:sp>
-      <p:pic>
-        <p:nvPicPr>
-          <p:cNvPr id="4" name="Picture 3">
-            <a:extLst>
-              <a:ext uri="{FF2B5EF4-FFF2-40B4-BE49-F238E27FC236}">
-                <a16:creationId xmlns:a16="http://schemas.microsoft.com/office/drawing/2014/main" id="{51B42C24-B636-F2EB-82D0-A74E7A00A61C}"/>
-              </a:ext>
-            </a:extLst>
-          </p:cNvPr>
-          <p:cNvPicPr>
-            <a:picLocks noChangeAspect="1"/>
-          </p:cNvPicPr>
-          <p:nvPr/>
-        </p:nvPicPr>
-        <p:blipFill>
-          <a:blip r:embed="rId3"/>
-          <a:stretch>
-            <a:fillRect/>
-          </a:stretch>
-        </p:blipFill>
-        <p:spPr>
-          <a:xfrm>
-            <a:off x="7880325" y="300878"/>
-            <a:ext cx="854100" cy="854100"/>
-          </a:xfrm>
-          <a:prstGeom prst="rect">
-            <a:avLst/>
-          </a:prstGeom>
-        </p:spPr>
-      </p:pic>
-      <p:sp>
-        <p:nvSpPr>
-          <p:cNvPr id="2" name="TextBox 1">
-            <a:extLst>
-              <a:ext uri="{FF2B5EF4-FFF2-40B4-BE49-F238E27FC236}">
-                <a16:creationId xmlns:a16="http://schemas.microsoft.com/office/drawing/2014/main" id="{03ED8831-A095-9799-B918-FA5F56D21530}"/>
-              </a:ext>
-            </a:extLst>
-          </p:cNvPr>
-          <p:cNvSpPr txBox="1"/>
-          <p:nvPr/>
-        </p:nvSpPr>
-        <p:spPr>
-          <a:xfrm>
-            <a:off x="7620000" y="466165"/>
-            <a:ext cx="1294200" cy="523220"/>
-          </a:xfrm>
-          <a:prstGeom prst="rect">
-            <a:avLst/>
-          </a:prstGeom>
-          <a:solidFill>
-            <a:schemeClr val="accent6">
-              <a:lumMod val="40000"/>
-              <a:lumOff val="60000"/>
-            </a:schemeClr>
-          </a:solidFill>
-        </p:spPr>
-        <p:txBody>
-          <a:bodyPr wrap="square" rtlCol="0">
-            <a:spAutoFit/>
-          </a:bodyPr>
-          <a:lstStyle/>
-          <a:p>
-            <a:r>
-              <a:rPr lang="en-US" dirty="0">
-                <a:solidFill>
-                  <a:srgbClr val="FF0000"/>
-                </a:solidFill>
-              </a:rPr>
-              <a:t>FIX to point at new slides</a:t>
-            </a:r>
-          </a:p>
-        </p:txBody>
-      </p:sp>
       <p:sp>
         <p:nvSpPr>
           <p:cNvPr id="3" name="Google Shape;49;p8">
@@ -4961,6 +4887,36 @@
           </a:p>
         </p:txBody>
       </p:sp>
+      <p:pic>
+        <p:nvPicPr>
+          <p:cNvPr id="6" name="Picture 5">
+            <a:extLst>
+              <a:ext uri="{FF2B5EF4-FFF2-40B4-BE49-F238E27FC236}">
+                <a16:creationId xmlns:a16="http://schemas.microsoft.com/office/drawing/2014/main" id="{9082DFBC-B0CF-A21A-7595-0B1813DAE232}"/>
+              </a:ext>
+            </a:extLst>
+          </p:cNvPr>
+          <p:cNvPicPr>
+            <a:picLocks noChangeAspect="1"/>
+          </p:cNvPicPr>
+          <p:nvPr/>
+        </p:nvPicPr>
+        <p:blipFill>
+          <a:blip r:embed="rId3"/>
+          <a:stretch>
+            <a:fillRect/>
+          </a:stretch>
+        </p:blipFill>
+        <p:spPr>
+          <a:xfrm>
+            <a:off x="8048546" y="202700"/>
+            <a:ext cx="865654" cy="865654"/>
+          </a:xfrm>
+          <a:prstGeom prst="rect">
+            <a:avLst/>
+          </a:prstGeom>
+        </p:spPr>
+      </p:pic>
     </p:spTree>
   </p:cSld>
   <p:clrMapOvr>
@@ -12765,6 +12721,23 @@
 </file>
 
 <file path=customXml/item1.xml><?xml version="1.0" encoding="utf-8"?>
+<p:properties xmlns:p="http://schemas.microsoft.com/office/2006/metadata/properties" xmlns:xsi="http://www.w3.org/2001/XMLSchema-instance" xmlns:pc="http://schemas.microsoft.com/office/infopath/2007/PartnerControls">
+  <documentManagement>
+    <_activity xmlns="2c13b40f-93e8-44d0-9439-bff2a3aff2ef" xsi:nil="true"/>
+  </documentManagement>
+</p:properties>
+</file>
+
+<file path=customXml/item2.xml><?xml version="1.0" encoding="utf-8"?>
+<?mso-contentType ?>
+<FormTemplates xmlns="http://schemas.microsoft.com/sharepoint/v3/contenttype/forms">
+  <Display>DocumentLibraryForm</Display>
+  <Edit>DocumentLibraryForm</Edit>
+  <New>DocumentLibraryForm</New>
+</FormTemplates>
+</file>
+
+<file path=customXml/item3.xml><?xml version="1.0" encoding="utf-8"?>
 <ct:contentTypeSchema xmlns:ct="http://schemas.microsoft.com/office/2006/metadata/contentType" xmlns:ma="http://schemas.microsoft.com/office/2006/metadata/properties/metaAttributes" ct:_="" ma:_="" ma:contentTypeName="Document" ma:contentTypeID="0x01010083BC8A387F61784BA7FCD14D3BD9BA97" ma:contentTypeVersion="9" ma:contentTypeDescription="Create a new document." ma:contentTypeScope="" ma:versionID="ab9bd752c275b64874dc0833a8669543">
   <xsd:schema xmlns:xsd="http://www.w3.org/2001/XMLSchema" xmlns:xs="http://www.w3.org/2001/XMLSchema" xmlns:p="http://schemas.microsoft.com/office/2006/metadata/properties" xmlns:ns3="2c13b40f-93e8-44d0-9439-bff2a3aff2ef" xmlns:ns4="1dedc83c-9b83-4e9e-a3ee-ea7e82b4a201" targetNamespace="http://schemas.microsoft.com/office/2006/metadata/properties" ma:root="true" ma:fieldsID="7884d37d3f3583bf67357d5b8e952c02" ns3:_="" ns4:_="">
     <xsd:import namespace="2c13b40f-93e8-44d0-9439-bff2a3aff2ef"/>
@@ -12959,24 +12932,32 @@
 </ct:contentTypeSchema>
 </file>
 
-<file path=customXml/item2.xml><?xml version="1.0" encoding="utf-8"?>
-<?mso-contentType ?>
-<FormTemplates xmlns="http://schemas.microsoft.com/sharepoint/v3/contenttype/forms">
-  <Display>DocumentLibraryForm</Display>
-  <Edit>DocumentLibraryForm</Edit>
-  <New>DocumentLibraryForm</New>
-</FormTemplates>
+<file path=customXml/itemProps1.xml><?xml version="1.0" encoding="utf-8"?>
+<ds:datastoreItem xmlns:ds="http://schemas.openxmlformats.org/officeDocument/2006/customXml" ds:itemID="{2E62BA38-5CD8-4CF6-B14C-B5E0E849EECA}">
+  <ds:schemaRefs>
+    <ds:schemaRef ds:uri="http://schemas.microsoft.com/office/2006/documentManagement/types"/>
+    <ds:schemaRef ds:uri="1dedc83c-9b83-4e9e-a3ee-ea7e82b4a201"/>
+    <ds:schemaRef ds:uri="http://schemas.microsoft.com/office/2006/metadata/properties"/>
+    <ds:schemaRef ds:uri="http://purl.org/dc/terms/"/>
+    <ds:schemaRef ds:uri="http://purl.org/dc/dcmitype/"/>
+    <ds:schemaRef ds:uri="http://schemas.openxmlformats.org/package/2006/metadata/core-properties"/>
+    <ds:schemaRef ds:uri="http://schemas.microsoft.com/office/infopath/2007/PartnerControls"/>
+    <ds:schemaRef ds:uri="2c13b40f-93e8-44d0-9439-bff2a3aff2ef"/>
+    <ds:schemaRef ds:uri="http://www.w3.org/XML/1998/namespace"/>
+    <ds:schemaRef ds:uri="http://purl.org/dc/elements/1.1/"/>
+  </ds:schemaRefs>
+</ds:datastoreItem>
 </file>
 
-<file path=customXml/item3.xml><?xml version="1.0" encoding="utf-8"?>
-<p:properties xmlns:p="http://schemas.microsoft.com/office/2006/metadata/properties" xmlns:xsi="http://www.w3.org/2001/XMLSchema-instance" xmlns:pc="http://schemas.microsoft.com/office/infopath/2007/PartnerControls">
-  <documentManagement>
-    <_activity xmlns="2c13b40f-93e8-44d0-9439-bff2a3aff2ef" xsi:nil="true"/>
-  </documentManagement>
-</p:properties>
+<file path=customXml/itemProps2.xml><?xml version="1.0" encoding="utf-8"?>
+<ds:datastoreItem xmlns:ds="http://schemas.openxmlformats.org/officeDocument/2006/customXml" ds:itemID="{24B6D469-2EE5-4294-AD1E-F96757AC7F57}">
+  <ds:schemaRefs>
+    <ds:schemaRef ds:uri="http://schemas.microsoft.com/sharepoint/v3/contenttype/forms"/>
+  </ds:schemaRefs>
+</ds:datastoreItem>
 </file>
 
-<file path=customXml/itemProps1.xml><?xml version="1.0" encoding="utf-8"?>
+<file path=customXml/itemProps3.xml><?xml version="1.0" encoding="utf-8"?>
 <ds:datastoreItem xmlns:ds="http://schemas.openxmlformats.org/officeDocument/2006/customXml" ds:itemID="{7C1E51B2-0B7C-40F5-9B89-16CA851D5762}">
   <ds:schemaRefs>
     <ds:schemaRef ds:uri="http://schemas.microsoft.com/office/2006/metadata/contentType"/>
@@ -12993,29 +12974,4 @@
     <ds:schemaRef ds:uri="http://schemas.microsoft.com/internal/obd"/>
   </ds:schemaRefs>
 </ds:datastoreItem>
-</file>
-
-<file path=customXml/itemProps2.xml><?xml version="1.0" encoding="utf-8"?>
-<ds:datastoreItem xmlns:ds="http://schemas.openxmlformats.org/officeDocument/2006/customXml" ds:itemID="{24B6D469-2EE5-4294-AD1E-F96757AC7F57}">
-  <ds:schemaRefs>
-    <ds:schemaRef ds:uri="http://schemas.microsoft.com/sharepoint/v3/contenttype/forms"/>
-  </ds:schemaRefs>
-</ds:datastoreItem>
-</file>
-
-<file path=customXml/itemProps3.xml><?xml version="1.0" encoding="utf-8"?>
-<ds:datastoreItem xmlns:ds="http://schemas.openxmlformats.org/officeDocument/2006/customXml" ds:itemID="{2E62BA38-5CD8-4CF6-B14C-B5E0E849EECA}">
-  <ds:schemaRefs>
-    <ds:schemaRef ds:uri="http://schemas.microsoft.com/office/2006/documentManagement/types"/>
-    <ds:schemaRef ds:uri="1dedc83c-9b83-4e9e-a3ee-ea7e82b4a201"/>
-    <ds:schemaRef ds:uri="http://schemas.microsoft.com/office/2006/metadata/properties"/>
-    <ds:schemaRef ds:uri="http://purl.org/dc/terms/"/>
-    <ds:schemaRef ds:uri="http://purl.org/dc/dcmitype/"/>
-    <ds:schemaRef ds:uri="http://schemas.openxmlformats.org/package/2006/metadata/core-properties"/>
-    <ds:schemaRef ds:uri="http://schemas.microsoft.com/office/infopath/2007/PartnerControls"/>
-    <ds:schemaRef ds:uri="2c13b40f-93e8-44d0-9439-bff2a3aff2ef"/>
-    <ds:schemaRef ds:uri="http://www.w3.org/XML/1998/namespace"/>
-    <ds:schemaRef ds:uri="http://purl.org/dc/elements/1.1/"/>
-  </ds:schemaRefs>
-</ds:datastoreItem>
 </file>
</xml_diff>